<commit_message>
Update PYTHON_13_Working With Numbers.pptx
</commit_message>
<xml_diff>
--- a/PYTHON_13_Working With Numbers.pptx
+++ b/PYTHON_13_Working With Numbers.pptx
@@ -12,7 +12,8 @@
     <p:sldId id="295" r:id="rId6"/>
     <p:sldId id="296" r:id="rId7"/>
     <p:sldId id="297" r:id="rId8"/>
-    <p:sldId id="291" r:id="rId9"/>
+    <p:sldId id="298" r:id="rId9"/>
+    <p:sldId id="291" r:id="rId10"/>
   </p:sldIdLst>
   <p:sldSz cx="12192000" cy="6858000"/>
   <p:notesSz cx="6858000" cy="9144000"/>
@@ -4463,6 +4464,135 @@
           <p:cNvPr id="2" name="Title 1">
             <a:extLst>
               <a:ext uri="{FF2B5EF4-FFF2-40B4-BE49-F238E27FC236}">
+                <a16:creationId xmlns:a16="http://schemas.microsoft.com/office/drawing/2014/main" id="{5A92C067-780C-48ED-80AA-13CD229D51DA}"/>
+              </a:ext>
+            </a:extLst>
+          </p:cNvPr>
+          <p:cNvSpPr>
+            <a:spLocks noGrp="1"/>
+          </p:cNvSpPr>
+          <p:nvPr>
+            <p:ph type="title"/>
+          </p:nvPr>
+        </p:nvSpPr>
+        <p:spPr/>
+        <p:txBody>
+          <a:bodyPr/>
+          <a:lstStyle/>
+          <a:p>
+            <a:r>
+              <a:rPr lang="en-US" b="1" dirty="0"/>
+              <a:t>Numbers can also be assigned like this </a:t>
+            </a:r>
+          </a:p>
+        </p:txBody>
+      </p:sp>
+      <p:sp>
+        <p:nvSpPr>
+          <p:cNvPr id="3" name="Content Placeholder 2">
+            <a:extLst>
+              <a:ext uri="{FF2B5EF4-FFF2-40B4-BE49-F238E27FC236}">
+                <a16:creationId xmlns:a16="http://schemas.microsoft.com/office/drawing/2014/main" id="{8DF2686E-F99C-43D3-B3E6-EFFCA0EC4C36}"/>
+              </a:ext>
+            </a:extLst>
+          </p:cNvPr>
+          <p:cNvSpPr>
+            <a:spLocks noGrp="1"/>
+          </p:cNvSpPr>
+          <p:nvPr>
+            <p:ph idx="1"/>
+          </p:nvPr>
+        </p:nvSpPr>
+        <p:spPr/>
+        <p:txBody>
+          <a:bodyPr/>
+          <a:lstStyle/>
+          <a:p>
+            <a:pPr marL="0" indent="0">
+              <a:buNone/>
+            </a:pPr>
+            <a:r>
+              <a:rPr lang="en-US" sz="3600" dirty="0"/>
+              <a:t>–  </a:t>
+            </a:r>
+            <a:r>
+              <a:rPr lang="en-US" sz="3600" dirty="0" err="1"/>
+              <a:t>a,b,c,d</a:t>
+            </a:r>
+            <a:r>
+              <a:rPr lang="en-US" sz="3600" dirty="0"/>
+              <a:t> = 3,4,5,6</a:t>
+            </a:r>
+          </a:p>
+          <a:p>
+            <a:pPr marL="0" indent="0">
+              <a:buNone/>
+            </a:pPr>
+            <a:r>
+              <a:rPr lang="en-US" sz="3600" dirty="0"/>
+              <a:t>    print (</a:t>
+            </a:r>
+            <a:r>
+              <a:rPr lang="en-US" sz="3600" dirty="0" err="1"/>
+              <a:t>a,b,c,d</a:t>
+            </a:r>
+            <a:r>
+              <a:rPr lang="en-US" sz="3600" dirty="0"/>
+              <a:t>)</a:t>
+            </a:r>
+          </a:p>
+          <a:p>
+            <a:pPr marL="0" indent="0">
+              <a:buNone/>
+            </a:pPr>
+            <a:br>
+              <a:rPr lang="en-US" dirty="0"/>
+            </a:br>
+            <a:endParaRPr lang="en-US" dirty="0"/>
+          </a:p>
+          <a:p>
+            <a:pPr marL="0" indent="0">
+              <a:buNone/>
+            </a:pPr>
+            <a:endParaRPr lang="en-US" dirty="0"/>
+          </a:p>
+        </p:txBody>
+      </p:sp>
+    </p:spTree>
+    <p:extLst>
+      <p:ext uri="{BB962C8B-B14F-4D97-AF65-F5344CB8AC3E}">
+        <p14:creationId xmlns:p14="http://schemas.microsoft.com/office/powerpoint/2010/main" val="795564364"/>
+      </p:ext>
+    </p:extLst>
+  </p:cSld>
+  <p:clrMapOvr>
+    <a:masterClrMapping/>
+  </p:clrMapOvr>
+</p:sld>
+</file>
+
+<file path=ppt/slides/slide9.xml><?xml version="1.0" encoding="utf-8"?>
+<p:sld xmlns:a="http://schemas.openxmlformats.org/drawingml/2006/main" xmlns:r="http://schemas.openxmlformats.org/officeDocument/2006/relationships" xmlns:p="http://schemas.openxmlformats.org/presentationml/2006/main">
+  <p:cSld>
+    <p:spTree>
+      <p:nvGrpSpPr>
+        <p:cNvPr id="1" name=""/>
+        <p:cNvGrpSpPr/>
+        <p:nvPr/>
+      </p:nvGrpSpPr>
+      <p:grpSpPr>
+        <a:xfrm>
+          <a:off x="0" y="0"/>
+          <a:ext cx="0" cy="0"/>
+          <a:chOff x="0" y="0"/>
+          <a:chExt cx="0" cy="0"/>
+        </a:xfrm>
+      </p:grpSpPr>
+      <p:sp>
+        <p:nvSpPr>
+          <p:cNvPr id="2" name="Title 1">
+            <a:extLst>
+              <a:ext uri="{FF2B5EF4-FFF2-40B4-BE49-F238E27FC236}">
                 <a16:creationId xmlns:a16="http://schemas.microsoft.com/office/drawing/2014/main" id="{4EFC647E-BEC0-4E89-8B7A-37CA0A51DB61}"/>
               </a:ext>
             </a:extLst>

</xml_diff>